<commit_message>
update cheatsheets, version number, and NEWs
</commit_message>
<xml_diff>
--- a/docs/cheat_sheets/DLMtool_CheatSheets.pptx
+++ b/docs/cheat_sheets/DLMtool_CheatSheets.pptx
@@ -5367,7 +5367,7 @@
         <p:grpSpPr>
           <a:xfrm>
             <a:off x="9939883" y="684177"/>
-            <a:ext cx="1575818" cy="3931975"/>
+            <a:ext cx="1415547" cy="3532067"/>
             <a:chOff x="8758836" y="2597366"/>
             <a:chExt cx="1940979" cy="4843123"/>
           </a:xfrm>
@@ -5899,7 +5899,7 @@
             </a:r>
             <a:r>
               <a:rPr lang="en-US" dirty="0"/>
-              <a:t>5.2</a:t>
+              <a:t>5.3</a:t>
             </a:r>
             <a:r>
               <a:rPr dirty="0"/>
@@ -5907,15 +5907,15 @@
             </a:r>
             <a:r>
               <a:rPr lang="en-US" dirty="0"/>
-              <a:t>September </a:t>
+              <a:t>January </a:t>
             </a:r>
             <a:r>
               <a:rPr dirty="0"/>
               <a:t>201</a:t>
             </a:r>
             <a:r>
-              <a:rPr lang="en-US" dirty="0"/>
-              <a:t>8</a:t>
+              <a:rPr lang="en-AU" dirty="0"/>
+              <a:t>9</a:t>
             </a:r>
             <a:endParaRPr dirty="0"/>
           </a:p>
@@ -5930,13 +5930,13 @@
           <p:nvPr>
             <p:extLst>
               <p:ext uri="{D42A27DB-BD31-4B8C-83A1-F6EECF244321}">
-                <p14:modId xmlns:p14="http://schemas.microsoft.com/office/powerpoint/2010/main" val="1792184370"/>
+                <p14:modId xmlns:p14="http://schemas.microsoft.com/office/powerpoint/2010/main" val="435676596"/>
               </p:ext>
             </p:extLst>
           </p:nvPr>
         </p:nvGraphicFramePr>
         <p:xfrm>
-          <a:off x="9913473" y="5202260"/>
+          <a:off x="9913473" y="4541860"/>
           <a:ext cx="3677210" cy="1718515"/>
         </p:xfrm>
         <a:graphic>
@@ -7515,7 +7515,7 @@
         </p:nvSpPr>
         <p:spPr>
           <a:xfrm>
-            <a:off x="9939883" y="4931925"/>
+            <a:off x="9939883" y="4271525"/>
             <a:ext cx="3624390" cy="333425"/>
           </a:xfrm>
           <a:prstGeom prst="rect">
@@ -7565,7 +7565,7 @@
         </p:nvSpPr>
         <p:spPr>
           <a:xfrm flipV="1">
-            <a:off x="9974607" y="4783169"/>
+            <a:off x="9974607" y="4122769"/>
             <a:ext cx="2928939" cy="15875"/>
           </a:xfrm>
           <a:prstGeom prst="line">
@@ -7607,7 +7607,7 @@
         </p:nvSpPr>
         <p:spPr>
           <a:xfrm>
-            <a:off x="9887025" y="6786519"/>
+            <a:off x="9887025" y="6126119"/>
             <a:ext cx="3852337" cy="579646"/>
           </a:xfrm>
           <a:prstGeom prst="rect">
@@ -8270,6 +8270,64 @@
               <a:t>('Stock')</a:t>
             </a:r>
             <a:endParaRPr dirty="0"/>
+          </a:p>
+        </p:txBody>
+      </p:sp>
+      <p:sp>
+        <p:nvSpPr>
+          <p:cNvPr id="48" name="Rectangle 47">
+            <a:extLst>
+              <a:ext uri="{FF2B5EF4-FFF2-40B4-BE49-F238E27FC236}">
+                <a16:creationId xmlns:a16="http://schemas.microsoft.com/office/drawing/2014/main" id="{25674987-EB75-4FBE-B9D9-F0B462369DC5}"/>
+              </a:ext>
+            </a:extLst>
+          </p:cNvPr>
+          <p:cNvSpPr/>
+          <p:nvPr/>
+        </p:nvSpPr>
+        <p:spPr>
+          <a:xfrm>
+            <a:off x="9887025" y="6709239"/>
+            <a:ext cx="2502608" cy="579646"/>
+          </a:xfrm>
+          <a:prstGeom prst="rect">
+            <a:avLst/>
+          </a:prstGeom>
+        </p:spPr>
+        <p:txBody>
+          <a:bodyPr wrap="none">
+            <a:spAutoFit/>
+          </a:bodyPr>
+          <a:lstStyle/>
+          <a:p>
+            <a:pPr>
+              <a:lnSpc>
+                <a:spcPct val="150000"/>
+              </a:lnSpc>
+            </a:pPr>
+            <a:r>
+              <a:rPr lang="en-US" dirty="0">
+                <a:latin typeface="Segoe UI" panose="020B0502040204020203" pitchFamily="34" charset="0"/>
+                <a:cs typeface="Segoe UI" panose="020B0502040204020203" pitchFamily="34" charset="0"/>
+              </a:rPr>
+              <a:t>Find MPs using Data slot: </a:t>
+            </a:r>
+            <a:r>
+              <a:rPr lang="en-US" b="0" dirty="0">
+                <a:latin typeface="Segoe UI" panose="020B0502040204020203" pitchFamily="34" charset="0"/>
+                <a:cs typeface="Segoe UI" panose="020B0502040204020203" pitchFamily="34" charset="0"/>
+              </a:rPr>
+              <a:t>Uses()</a:t>
+            </a:r>
+          </a:p>
+          <a:p>
+            <a:r>
+              <a:rPr lang="en-US" b="0" dirty="0">
+                <a:latin typeface="Segoe UI" panose="020B0502040204020203" pitchFamily="34" charset="0"/>
+                <a:cs typeface="Segoe UI" panose="020B0502040204020203" pitchFamily="34" charset="0"/>
+              </a:rPr>
+              <a:t>e.g.	Uses('Mort')</a:t>
+            </a:r>
           </a:p>
         </p:txBody>
       </p:sp>
@@ -8540,23 +8598,23 @@
             </a:r>
             <a:r>
               <a:rPr lang="en-US" dirty="0"/>
-              <a:t>5.2</a:t>
+              <a:t>5.3</a:t>
             </a:r>
             <a:r>
               <a:rPr dirty="0"/>
-              <a:t> •  Updated: </a:t>
-            </a:r>
-            <a:r>
-              <a:rPr lang="en-US" dirty="0"/>
-              <a:t>September </a:t>
+              <a:t> •  Updated:</a:t>
+            </a:r>
+            <a:r>
+              <a:rPr lang="en-AU" dirty="0"/>
+              <a:t> January </a:t>
             </a:r>
             <a:r>
               <a:rPr dirty="0"/>
               <a:t>201</a:t>
             </a:r>
             <a:r>
-              <a:rPr lang="en-US" dirty="0"/>
-              <a:t>8</a:t>
+              <a:rPr lang="en-AU"/>
+              <a:t>9</a:t>
             </a:r>
             <a:endParaRPr dirty="0"/>
           </a:p>
@@ -11135,26 +11193,15 @@
                 <a:latin typeface="Segoe UI" panose="020B0502040204020203" pitchFamily="34" charset="0"/>
                 <a:cs typeface="Segoe UI" panose="020B0502040204020203" pitchFamily="34" charset="0"/>
               </a:rPr>
-              <a:t>MSE@Misc</a:t>
-            </a:r>
-            <a:r>
-              <a:rPr lang="en-US" b="0" dirty="0">
-                <a:latin typeface="Segoe UI" panose="020B0502040204020203" pitchFamily="34" charset="0"/>
-                <a:cs typeface="Segoe UI" panose="020B0502040204020203" pitchFamily="34" charset="0"/>
-              </a:rPr>
-              <a:t>[[1]]@</a:t>
-            </a:r>
-            <a:r>
-              <a:rPr lang="en-US" b="0" dirty="0" err="1">
-                <a:latin typeface="Segoe UI" panose="020B0502040204020203" pitchFamily="34" charset="0"/>
-                <a:cs typeface="Segoe UI" panose="020B0502040204020203" pitchFamily="34" charset="0"/>
-              </a:rPr>
-              <a:t>Ind</a:t>
-            </a:r>
-            <a:endParaRPr lang="en-US" b="0" dirty="0">
-              <a:latin typeface="Segoe UI" panose="020B0502040204020203" pitchFamily="34" charset="0"/>
-              <a:cs typeface="Segoe UI" panose="020B0502040204020203" pitchFamily="34" charset="0"/>
-            </a:endParaRPr>
+              <a:t>MSE@Misc$Data</a:t>
+            </a:r>
+            <a:r>
+              <a:rPr lang="en-US" b="0" dirty="0">
+                <a:latin typeface="Segoe UI" panose="020B0502040204020203" pitchFamily="34" charset="0"/>
+                <a:cs typeface="Segoe UI" panose="020B0502040204020203" pitchFamily="34" charset="0"/>
+              </a:rPr>
+              <a:t>[[1]]@Ind</a:t>
+            </a:r>
           </a:p>
           <a:p>
             <a:pPr>

</xml_diff>